<commit_message>
create java array to string
</commit_message>
<xml_diff>
--- a/Article/Spring/스프링_코드로_본_핵사고날_아키텍처/img/img.pptx
+++ b/Article/Spring/스프링_코드로_본_핵사고날_아키텍처/img/img.pptx
@@ -8316,82 +8316,12 @@
           </a:fontRef>
         </p:style>
       </p:cxnSp>
-      <p:sp>
-        <p:nvSpPr>
-          <p:cNvPr id="36" name="직사각형 35">
-            <a:extLst>
-              <a:ext uri="{FF2B5EF4-FFF2-40B4-BE49-F238E27FC236}">
-                <a16:creationId xmlns:a16="http://schemas.microsoft.com/office/drawing/2014/main" id="{2CF6469C-56E5-9540-BAD5-1797B89A4580}"/>
-              </a:ext>
-            </a:extLst>
-          </p:cNvPr>
-          <p:cNvSpPr/>
-          <p:nvPr/>
-        </p:nvSpPr>
-        <p:spPr>
-          <a:xfrm>
-            <a:off x="694128" y="4352300"/>
-            <a:ext cx="2000708" cy="795269"/>
-          </a:xfrm>
-          <a:prstGeom prst="rect">
-            <a:avLst/>
-          </a:prstGeom>
-          <a:solidFill>
-            <a:schemeClr val="bg1"/>
-          </a:solidFill>
-          <a:ln w="38100">
-            <a:solidFill>
-              <a:srgbClr val="00B050"/>
-            </a:solidFill>
-          </a:ln>
-        </p:spPr>
-        <p:style>
-          <a:lnRef idx="2">
-            <a:schemeClr val="accent1">
-              <a:shade val="50000"/>
-            </a:schemeClr>
-          </a:lnRef>
-          <a:fillRef idx="1">
-            <a:schemeClr val="accent1"/>
-          </a:fillRef>
-          <a:effectRef idx="0">
-            <a:schemeClr val="accent1"/>
-          </a:effectRef>
-          <a:fontRef idx="minor">
-            <a:schemeClr val="lt1"/>
-          </a:fontRef>
-        </p:style>
-        <p:txBody>
-          <a:bodyPr rtlCol="0" anchor="ctr"/>
-          <a:lstStyle/>
-          <a:p>
-            <a:pPr algn="ctr"/>
-            <a:r>
-              <a:rPr kumimoji="1" lang="en-US" altLang="ko-KR" dirty="0" err="1">
-                <a:solidFill>
-                  <a:schemeClr val="tx1"/>
-                </a:solidFill>
-                <a:latin typeface="Noto Sans KR Medium" panose="020B0500000000000000" pitchFamily="34" charset="-128"/>
-                <a:ea typeface="Noto Sans KR Medium" panose="020B0500000000000000" pitchFamily="34" charset="-128"/>
-              </a:rPr>
-              <a:t>gRPC</a:t>
-            </a:r>
-            <a:endParaRPr kumimoji="1" lang="ko-KR" altLang="en-US" dirty="0">
-              <a:solidFill>
-                <a:schemeClr val="tx1"/>
-              </a:solidFill>
-              <a:latin typeface="Noto Sans KR Medium" panose="020B0500000000000000" pitchFamily="34" charset="-128"/>
-              <a:ea typeface="Noto Sans KR Medium" panose="020B0500000000000000" pitchFamily="34" charset="-128"/>
-            </a:endParaRPr>
-          </a:p>
-        </p:txBody>
-      </p:sp>
       <p:cxnSp>
         <p:nvCxnSpPr>
-          <p:cNvPr id="38" name="직선 화살표 연결선 37">
-            <a:extLst>
-              <a:ext uri="{FF2B5EF4-FFF2-40B4-BE49-F238E27FC236}">
-                <a16:creationId xmlns:a16="http://schemas.microsoft.com/office/drawing/2014/main" id="{298C330F-C8D9-6E4E-AB7E-A0FB5F75921D}"/>
+          <p:cNvPr id="43" name="직선 연결선[R] 42">
+            <a:extLst>
+              <a:ext uri="{FF2B5EF4-FFF2-40B4-BE49-F238E27FC236}">
+                <a16:creationId xmlns:a16="http://schemas.microsoft.com/office/drawing/2014/main" id="{B49DCC80-1996-7149-8198-25FB7B604D89}"/>
               </a:ext>
             </a:extLst>
           </p:cNvPr>
@@ -8401,94 +8331,6 @@
           <p:nvPr/>
         </p:nvCxnSpPr>
         <p:spPr>
-          <a:xfrm flipV="1">
-            <a:off x="1684130" y="2069283"/>
-            <a:ext cx="1602053" cy="2283017"/>
-          </a:xfrm>
-          <a:prstGeom prst="straightConnector1">
-            <a:avLst/>
-          </a:prstGeom>
-          <a:ln w="38100">
-            <a:solidFill>
-              <a:srgbClr val="00B050"/>
-            </a:solidFill>
-            <a:tailEnd type="triangle"/>
-          </a:ln>
-        </p:spPr>
-        <p:style>
-          <a:lnRef idx="1">
-            <a:schemeClr val="accent1"/>
-          </a:lnRef>
-          <a:fillRef idx="0">
-            <a:schemeClr val="accent1"/>
-          </a:fillRef>
-          <a:effectRef idx="0">
-            <a:schemeClr val="accent1"/>
-          </a:effectRef>
-          <a:fontRef idx="minor">
-            <a:schemeClr val="tx1"/>
-          </a:fontRef>
-        </p:style>
-      </p:cxnSp>
-      <p:cxnSp>
-        <p:nvCxnSpPr>
-          <p:cNvPr id="39" name="직선 화살표 연결선 38">
-            <a:extLst>
-              <a:ext uri="{FF2B5EF4-FFF2-40B4-BE49-F238E27FC236}">
-                <a16:creationId xmlns:a16="http://schemas.microsoft.com/office/drawing/2014/main" id="{B0A1B12A-EDA8-2349-BE8E-EA29D15743DD}"/>
-              </a:ext>
-            </a:extLst>
-          </p:cNvPr>
-          <p:cNvCxnSpPr>
-            <a:cxnSpLocks/>
-          </p:cNvCxnSpPr>
-          <p:nvPr/>
-        </p:nvCxnSpPr>
-        <p:spPr>
-          <a:xfrm flipV="1">
-            <a:off x="2119408" y="3038673"/>
-            <a:ext cx="702386" cy="1313627"/>
-          </a:xfrm>
-          <a:prstGeom prst="straightConnector1">
-            <a:avLst/>
-          </a:prstGeom>
-          <a:ln w="38100">
-            <a:solidFill>
-              <a:srgbClr val="00B050"/>
-            </a:solidFill>
-            <a:tailEnd type="triangle"/>
-          </a:ln>
-        </p:spPr>
-        <p:style>
-          <a:lnRef idx="1">
-            <a:schemeClr val="accent1"/>
-          </a:lnRef>
-          <a:fillRef idx="0">
-            <a:schemeClr val="accent1"/>
-          </a:fillRef>
-          <a:effectRef idx="0">
-            <a:schemeClr val="accent1"/>
-          </a:effectRef>
-          <a:fontRef idx="minor">
-            <a:schemeClr val="tx1"/>
-          </a:fontRef>
-        </p:style>
-      </p:cxnSp>
-      <p:cxnSp>
-        <p:nvCxnSpPr>
-          <p:cNvPr id="43" name="직선 연결선[R] 42">
-            <a:extLst>
-              <a:ext uri="{FF2B5EF4-FFF2-40B4-BE49-F238E27FC236}">
-                <a16:creationId xmlns:a16="http://schemas.microsoft.com/office/drawing/2014/main" id="{B49DCC80-1996-7149-8198-25FB7B604D89}"/>
-              </a:ext>
-            </a:extLst>
-          </p:cNvPr>
-          <p:cNvCxnSpPr>
-            <a:cxnSpLocks/>
-          </p:cNvCxnSpPr>
-          <p:nvPr/>
-        </p:nvCxnSpPr>
-        <p:spPr>
           <a:xfrm>
             <a:off x="7590459" y="2514195"/>
             <a:ext cx="509144" cy="0"/>
@@ -8519,60 +8361,6 @@
           </a:fontRef>
         </p:style>
       </p:cxnSp>
-      <p:sp>
-        <p:nvSpPr>
-          <p:cNvPr id="41" name="직사각형 40">
-            <a:extLst>
-              <a:ext uri="{FF2B5EF4-FFF2-40B4-BE49-F238E27FC236}">
-                <a16:creationId xmlns:a16="http://schemas.microsoft.com/office/drawing/2014/main" id="{E84ED80D-2783-ED4F-9970-18BB98237664}"/>
-              </a:ext>
-            </a:extLst>
-          </p:cNvPr>
-          <p:cNvSpPr/>
-          <p:nvPr/>
-        </p:nvSpPr>
-        <p:spPr>
-          <a:xfrm>
-            <a:off x="4401931" y="1380977"/>
-            <a:ext cx="9743736" cy="4165384"/>
-          </a:xfrm>
-          <a:prstGeom prst="rect">
-            <a:avLst/>
-          </a:prstGeom>
-          <a:solidFill>
-            <a:schemeClr val="bg1">
-              <a:alpha val="80000"/>
-            </a:schemeClr>
-          </a:solidFill>
-          <a:ln w="3175">
-            <a:noFill/>
-          </a:ln>
-        </p:spPr>
-        <p:style>
-          <a:lnRef idx="2">
-            <a:schemeClr val="accent1">
-              <a:shade val="50000"/>
-            </a:schemeClr>
-          </a:lnRef>
-          <a:fillRef idx="1">
-            <a:schemeClr val="accent1"/>
-          </a:fillRef>
-          <a:effectRef idx="0">
-            <a:schemeClr val="accent1"/>
-          </a:effectRef>
-          <a:fontRef idx="minor">
-            <a:schemeClr val="lt1"/>
-          </a:fontRef>
-        </p:style>
-        <p:txBody>
-          <a:bodyPr rtlCol="0" anchor="ctr"/>
-          <a:lstStyle/>
-          <a:p>
-            <a:pPr algn="ctr"/>
-            <a:endParaRPr kumimoji="1" lang="ko-KR" altLang="en-US" dirty="0"/>
-          </a:p>
-        </p:txBody>
-      </p:sp>
     </p:spTree>
     <p:extLst>
       <p:ext uri="{BB962C8B-B14F-4D97-AF65-F5344CB8AC3E}">
@@ -8603,6 +8391,36 @@
           <a:chExt cx="0" cy="0"/>
         </a:xfrm>
       </p:grpSpPr>
+      <p:pic>
+        <p:nvPicPr>
+          <p:cNvPr id="2" name="그림 1">
+            <a:extLst>
+              <a:ext uri="{FF2B5EF4-FFF2-40B4-BE49-F238E27FC236}">
+                <a16:creationId xmlns:a16="http://schemas.microsoft.com/office/drawing/2014/main" id="{E9F16B7F-7C62-2C4E-886A-DFAFA0663CED}"/>
+              </a:ext>
+            </a:extLst>
+          </p:cNvPr>
+          <p:cNvPicPr>
+            <a:picLocks noChangeAspect="1"/>
+          </p:cNvPicPr>
+          <p:nvPr/>
+        </p:nvPicPr>
+        <p:blipFill>
+          <a:blip r:embed="rId2"/>
+          <a:stretch>
+            <a:fillRect/>
+          </a:stretch>
+        </p:blipFill>
+        <p:spPr>
+          <a:xfrm>
+            <a:off x="1952044" y="985762"/>
+            <a:ext cx="8531359" cy="4976626"/>
+          </a:xfrm>
+          <a:prstGeom prst="rect">
+            <a:avLst/>
+          </a:prstGeom>
+        </p:spPr>
+      </p:pic>
     </p:spTree>
     <p:extLst>
       <p:ext uri="{BB962C8B-B14F-4D97-AF65-F5344CB8AC3E}">
@@ -8633,6 +8451,36 @@
           <a:chExt cx="0" cy="0"/>
         </a:xfrm>
       </p:grpSpPr>
+      <p:pic>
+        <p:nvPicPr>
+          <p:cNvPr id="3" name="그림 2">
+            <a:extLst>
+              <a:ext uri="{FF2B5EF4-FFF2-40B4-BE49-F238E27FC236}">
+                <a16:creationId xmlns:a16="http://schemas.microsoft.com/office/drawing/2014/main" id="{72D99662-82D2-DA42-93C1-269C9D8B3935}"/>
+              </a:ext>
+            </a:extLst>
+          </p:cNvPr>
+          <p:cNvPicPr>
+            <a:picLocks noChangeAspect="1"/>
+          </p:cNvPicPr>
+          <p:nvPr/>
+        </p:nvPicPr>
+        <p:blipFill>
+          <a:blip r:embed="rId2"/>
+          <a:stretch>
+            <a:fillRect/>
+          </a:stretch>
+        </p:blipFill>
+        <p:spPr>
+          <a:xfrm>
+            <a:off x="3788065" y="154546"/>
+            <a:ext cx="4358638" cy="6548907"/>
+          </a:xfrm>
+          <a:prstGeom prst="rect">
+            <a:avLst/>
+          </a:prstGeom>
+        </p:spPr>
+      </p:pic>
     </p:spTree>
     <p:extLst>
       <p:ext uri="{BB962C8B-B14F-4D97-AF65-F5344CB8AC3E}">

</xml_diff>